<commit_message>
fix some problems with docker
</commit_message>
<xml_diff>
--- a/01-DataPreprocessing/01-slides.pptx
+++ b/01-DataPreprocessing/01-slides.pptx
@@ -22348,6 +22348,158 @@
           </a:p>
         </p:txBody>
       </p:sp>
+      <p:pic>
+        <p:nvPicPr>
+          <p:cNvPr id="6" name="Picture 5">
+            <a:extLst>
+              <a:ext uri="{FF2B5EF4-FFF2-40B4-BE49-F238E27FC236}">
+                <a16:creationId xmlns:a16="http://schemas.microsoft.com/office/drawing/2014/main" id="{6A36EA08-4E99-47A6-B7D5-54F5B062BFA8}"/>
+              </a:ext>
+            </a:extLst>
+          </p:cNvPr>
+          <p:cNvPicPr>
+            <a:picLocks noChangeAspect="1"/>
+          </p:cNvPicPr>
+          <p:nvPr/>
+        </p:nvPicPr>
+        <p:blipFill>
+          <a:blip r:embed="rId9"/>
+          <a:stretch>
+            <a:fillRect/>
+          </a:stretch>
+        </p:blipFill>
+        <p:spPr>
+          <a:xfrm>
+            <a:off x="8179799" y="5335178"/>
+            <a:ext cx="2523036" cy="1451610"/>
+          </a:xfrm>
+          <a:prstGeom prst="rect">
+            <a:avLst/>
+          </a:prstGeom>
+        </p:spPr>
+      </p:pic>
+      <p:sp>
+        <p:nvSpPr>
+          <p:cNvPr id="11" name="Oval 10">
+            <a:extLst>
+              <a:ext uri="{FF2B5EF4-FFF2-40B4-BE49-F238E27FC236}">
+                <a16:creationId xmlns:a16="http://schemas.microsoft.com/office/drawing/2014/main" id="{8FF3E196-3C40-492E-B80E-976229957979}"/>
+              </a:ext>
+            </a:extLst>
+          </p:cNvPr>
+          <p:cNvSpPr/>
+          <p:nvPr/>
+        </p:nvSpPr>
+        <p:spPr>
+          <a:xfrm>
+            <a:off x="7943965" y="5106578"/>
+            <a:ext cx="457200" cy="457200"/>
+          </a:xfrm>
+          <a:prstGeom prst="ellipse">
+            <a:avLst/>
+          </a:prstGeom>
+          <a:solidFill>
+            <a:schemeClr val="bg1"/>
+          </a:solidFill>
+          <a:ln>
+            <a:solidFill>
+              <a:schemeClr val="tx1"/>
+            </a:solidFill>
+          </a:ln>
+        </p:spPr>
+        <p:style>
+          <a:lnRef idx="2">
+            <a:schemeClr val="accent1">
+              <a:shade val="50000"/>
+            </a:schemeClr>
+          </a:lnRef>
+          <a:fillRef idx="1">
+            <a:schemeClr val="accent1"/>
+          </a:fillRef>
+          <a:effectRef idx="0">
+            <a:schemeClr val="accent1"/>
+          </a:effectRef>
+          <a:fontRef idx="minor">
+            <a:schemeClr val="lt1"/>
+          </a:fontRef>
+        </p:style>
+        <p:txBody>
+          <a:bodyPr rtlCol="0" anchor="ctr"/>
+          <a:lstStyle/>
+          <a:p>
+            <a:pPr algn="ctr"/>
+            <a:r>
+              <a:rPr lang="it-IT" dirty="0">
+                <a:solidFill>
+                  <a:schemeClr val="tx1"/>
+                </a:solidFill>
+                <a:latin typeface="Helvetica" panose="020B0604020202020204" pitchFamily="34" charset="0"/>
+                <a:cs typeface="Helvetica" panose="020B0604020202020204" pitchFamily="34" charset="0"/>
+              </a:rPr>
+              <a:t>2</a:t>
+            </a:r>
+            <a:endParaRPr lang="en-US" dirty="0">
+              <a:solidFill>
+                <a:schemeClr val="tx1"/>
+              </a:solidFill>
+              <a:latin typeface="Helvetica" panose="020B0604020202020204" pitchFamily="34" charset="0"/>
+              <a:cs typeface="Helvetica" panose="020B0604020202020204" pitchFamily="34" charset="0"/>
+            </a:endParaRPr>
+          </a:p>
+        </p:txBody>
+      </p:sp>
+      <p:sp>
+        <p:nvSpPr>
+          <p:cNvPr id="7" name="Rectangle 6">
+            <a:extLst>
+              <a:ext uri="{FF2B5EF4-FFF2-40B4-BE49-F238E27FC236}">
+                <a16:creationId xmlns:a16="http://schemas.microsoft.com/office/drawing/2014/main" id="{CF8A1F29-5529-44D3-B6CC-31D16A0E2A30}"/>
+              </a:ext>
+            </a:extLst>
+          </p:cNvPr>
+          <p:cNvSpPr/>
+          <p:nvPr/>
+        </p:nvSpPr>
+        <p:spPr>
+          <a:xfrm>
+            <a:off x="8281851" y="6406956"/>
+            <a:ext cx="1166949" cy="316061"/>
+          </a:xfrm>
+          <a:prstGeom prst="rect">
+            <a:avLst/>
+          </a:prstGeom>
+          <a:noFill/>
+          <a:ln w="57150">
+            <a:solidFill>
+              <a:srgbClr val="FF0000"/>
+            </a:solidFill>
+          </a:ln>
+        </p:spPr>
+        <p:style>
+          <a:lnRef idx="2">
+            <a:schemeClr val="accent1">
+              <a:shade val="50000"/>
+            </a:schemeClr>
+          </a:lnRef>
+          <a:fillRef idx="1">
+            <a:schemeClr val="accent1"/>
+          </a:fillRef>
+          <a:effectRef idx="0">
+            <a:schemeClr val="accent1"/>
+          </a:effectRef>
+          <a:fontRef idx="minor">
+            <a:schemeClr val="lt1"/>
+          </a:fontRef>
+        </p:style>
+        <p:txBody>
+          <a:bodyPr rtlCol="0" anchor="ctr"/>
+          <a:lstStyle/>
+          <a:p>
+            <a:pPr algn="ctr"/>
+            <a:endParaRPr lang="en-US"/>
+          </a:p>
+        </p:txBody>
+      </p:sp>
     </p:spTree>
     <p:extLst>
       <p:ext uri="{BB962C8B-B14F-4D97-AF65-F5344CB8AC3E}">

</xml_diff>